<commit_message>
Updated with terms definitions
Updated with terms definitions - Group, Service, Task etc.
</commit_message>
<xml_diff>
--- a/OMS DevOps Process Using Openshift Features.pptx
+++ b/OMS DevOps Process Using Openshift Features.pptx
@@ -21023,7 +21023,7 @@
         <p:spPr>
           <a:xfrm>
             <a:off x="431263" y="1063998"/>
-            <a:ext cx="10827451" cy="4524315"/>
+            <a:ext cx="10827451" cy="4893647"/>
           </a:xfrm>
           <a:prstGeom prst="rect">
             <a:avLst/>
@@ -21091,6 +21091,13 @@
             <a:r>
               <a:rPr lang="en-US" sz="2400" i="1" dirty="0"/>
               <a:t>Call center application, Store application, BOPIS implementation etc.</a:t>
+            </a:r>
+          </a:p>
+          <a:p>
+            <a:pPr lvl="1"/>
+            <a:r>
+              <a:rPr lang="en-US" sz="2400" i="1" dirty="0"/>
+              <a:t>Shared Services</a:t>
             </a:r>
           </a:p>
           <a:p>

</xml_diff>